<commit_message>
revised code for team model
</commit_message>
<xml_diff>
--- a/2023 NBA Finals Presentation_6.7.2023.pptx
+++ b/2023 NBA Finals Presentation_6.7.2023.pptx
@@ -5,21 +5,22 @@
     <p:sldMasterId id="2147483648" r:id="rId1"/>
   </p:sldMasterIdLst>
   <p:notesMasterIdLst>
-    <p:notesMasterId r:id="rId11"/>
+    <p:notesMasterId r:id="rId12"/>
   </p:notesMasterIdLst>
   <p:handoutMasterIdLst>
-    <p:handoutMasterId r:id="rId12"/>
+    <p:handoutMasterId r:id="rId13"/>
   </p:handoutMasterIdLst>
   <p:sldIdLst>
-    <p:sldId id="257" r:id="rId2"/>
-    <p:sldId id="265" r:id="rId3"/>
-    <p:sldId id="266" r:id="rId4"/>
-    <p:sldId id="264" r:id="rId5"/>
-    <p:sldId id="267" r:id="rId6"/>
-    <p:sldId id="268" r:id="rId7"/>
-    <p:sldId id="269" r:id="rId8"/>
-    <p:sldId id="270" r:id="rId9"/>
-    <p:sldId id="271" r:id="rId10"/>
+    <p:sldId id="272" r:id="rId2"/>
+    <p:sldId id="257" r:id="rId3"/>
+    <p:sldId id="265" r:id="rId4"/>
+    <p:sldId id="266" r:id="rId5"/>
+    <p:sldId id="264" r:id="rId6"/>
+    <p:sldId id="267" r:id="rId7"/>
+    <p:sldId id="268" r:id="rId8"/>
+    <p:sldId id="269" r:id="rId9"/>
+    <p:sldId id="270" r:id="rId10"/>
+    <p:sldId id="271" r:id="rId11"/>
   </p:sldIdLst>
   <p:sldSz cx="12192000" cy="6858000"/>
   <p:notesSz cx="6858000" cy="9144000"/>
@@ -211,7 +212,7 @@
           <a:p>
             <a:fld id="{D8DE8356-FFDA-4E74-B804-79023C7DD259}" type="datetimeFigureOut">
               <a:rPr lang="en-US" smtClean="0"/>
-              <a:t>6/7/2023</a:t>
+              <a:t>6/8/2023</a:t>
             </a:fld>
             <a:endParaRPr lang="en-US"/>
           </a:p>
@@ -376,7 +377,7 @@
           <a:p>
             <a:fld id="{B43DDCE7-616C-4285-A468-7301F171BC93}" type="datetimeFigureOut">
               <a:rPr lang="en-US" smtClean="0"/>
-              <a:t>6/7/2023</a:t>
+              <a:t>6/8/2023</a:t>
             </a:fld>
             <a:endParaRPr lang="en-US"/>
           </a:p>
@@ -937,7 +938,7 @@
           <a:p>
             <a:fld id="{3762EC29-B8C5-4C7A-B6DA-418494D5CB21}" type="datetimeFigureOut">
               <a:rPr lang="en-US" smtClean="0"/>
-              <a:t>6/7/2023</a:t>
+              <a:t>6/8/2023</a:t>
             </a:fld>
             <a:endParaRPr lang="en-US"/>
           </a:p>
@@ -1130,7 +1131,7 @@
           <a:p>
             <a:fld id="{3762EC29-B8C5-4C7A-B6DA-418494D5CB21}" type="datetimeFigureOut">
               <a:rPr lang="en-US" smtClean="0"/>
-              <a:t>6/7/2023</a:t>
+              <a:t>6/8/2023</a:t>
             </a:fld>
             <a:endParaRPr lang="en-US"/>
           </a:p>
@@ -1313,7 +1314,7 @@
           <a:p>
             <a:fld id="{3762EC29-B8C5-4C7A-B6DA-418494D5CB21}" type="datetimeFigureOut">
               <a:rPr lang="en-US" smtClean="0"/>
-              <a:t>6/7/2023</a:t>
+              <a:t>6/8/2023</a:t>
             </a:fld>
             <a:endParaRPr lang="en-US"/>
           </a:p>
@@ -1578,7 +1579,7 @@
           <a:p>
             <a:fld id="{3762EC29-B8C5-4C7A-B6DA-418494D5CB21}" type="datetimeFigureOut">
               <a:rPr lang="en-US" smtClean="0"/>
-              <a:t>6/7/2023</a:t>
+              <a:t>6/8/2023</a:t>
             </a:fld>
             <a:endParaRPr lang="en-US"/>
           </a:p>
@@ -1822,7 +1823,7 @@
           <a:p>
             <a:fld id="{3762EC29-B8C5-4C7A-B6DA-418494D5CB21}" type="datetimeFigureOut">
               <a:rPr lang="en-US" smtClean="0"/>
-              <a:t>6/7/2023</a:t>
+              <a:t>6/8/2023</a:t>
             </a:fld>
             <a:endParaRPr lang="en-US"/>
           </a:p>
@@ -2210,7 +2211,7 @@
           <a:p>
             <a:fld id="{3762EC29-B8C5-4C7A-B6DA-418494D5CB21}" type="datetimeFigureOut">
               <a:rPr lang="en-US" smtClean="0"/>
-              <a:t>6/7/2023</a:t>
+              <a:t>6/8/2023</a:t>
             </a:fld>
             <a:endParaRPr lang="en-US"/>
           </a:p>
@@ -2342,7 +2343,7 @@
           <a:p>
             <a:fld id="{3762EC29-B8C5-4C7A-B6DA-418494D5CB21}" type="datetimeFigureOut">
               <a:rPr lang="en-US" smtClean="0"/>
-              <a:t>6/7/2023</a:t>
+              <a:t>6/8/2023</a:t>
             </a:fld>
             <a:endParaRPr lang="en-US"/>
           </a:p>
@@ -2452,7 +2453,7 @@
           <a:p>
             <a:fld id="{3762EC29-B8C5-4C7A-B6DA-418494D5CB21}" type="datetimeFigureOut">
               <a:rPr lang="en-US" smtClean="0"/>
-              <a:t>6/7/2023</a:t>
+              <a:t>6/8/2023</a:t>
             </a:fld>
             <a:endParaRPr lang="en-US"/>
           </a:p>
@@ -3249,7 +3250,7 @@
             <a:fld id="{3762EC29-B8C5-4C7A-B6DA-418494D5CB21}" type="datetimeFigureOut">
               <a:rPr lang="en-US" smtClean="0"/>
               <a:pPr/>
-              <a:t>6/7/2023</a:t>
+              <a:t>6/8/2023</a:t>
             </a:fld>
             <a:endParaRPr lang="en-US"/>
           </a:p>
@@ -3646,63 +3647,137 @@
           <a:chExt cx="0" cy="0"/>
         </a:xfrm>
       </p:grpSpPr>
-      <p:sp>
-        <p:nvSpPr>
-          <p:cNvPr id="2" name="Title 1"/>
-          <p:cNvSpPr>
-            <a:spLocks noGrp="1"/>
-          </p:cNvSpPr>
-          <p:nvPr>
-            <p:ph type="ctrTitle"/>
-          </p:nvPr>
+      <p:pic>
+        <p:nvPicPr>
+          <p:cNvPr id="2050" name="Picture 2" descr="Nba-commercial GIFs - Get the best GIF on GIPHY">
+            <a:extLst>
+              <a:ext uri="{FF2B5EF4-FFF2-40B4-BE49-F238E27FC236}">
+                <a16:creationId xmlns:a16="http://schemas.microsoft.com/office/drawing/2014/main" id="{682C8AAC-EC13-7EB4-F762-A9D137CE2CEF}"/>
+              </a:ext>
+            </a:extLst>
+          </p:cNvPr>
+          <p:cNvPicPr>
+            <a:picLocks noGrp="1" noChangeAspect="1" noChangeArrowheads="1"/>
+          </p:cNvPicPr>
+          <p:nvPr>
+            <p:ph idx="1"/>
+          </p:nvPr>
+        </p:nvPicPr>
+        <p:blipFill>
+          <a:blip r:embed="rId2">
+            <a:extLst>
+              <a:ext uri="{28A0092B-C50C-407E-A947-70E740481C1C}">
+                <a14:useLocalDpi xmlns:a14="http://schemas.microsoft.com/office/drawing/2010/main" val="0"/>
+              </a:ext>
+            </a:extLst>
+          </a:blip>
+          <a:srcRect/>
+          <a:stretch>
+            <a:fillRect/>
+          </a:stretch>
+        </p:blipFill>
+        <p:spPr bwMode="auto">
+          <a:xfrm>
+            <a:off x="609600" y="1143000"/>
+            <a:ext cx="10972800" cy="5257800"/>
+          </a:xfrm>
+          <a:prstGeom prst="rect">
+            <a:avLst/>
+          </a:prstGeom>
+          <a:noFill/>
+          <a:extLst>
+            <a:ext uri="{909E8E84-426E-40DD-AFC4-6F175D3DCCD1}">
+              <a14:hiddenFill xmlns:a14="http://schemas.microsoft.com/office/drawing/2010/main">
+                <a:solidFill>
+                  <a:srgbClr val="FFFFFF"/>
+                </a:solidFill>
+              </a14:hiddenFill>
+            </a:ext>
+          </a:extLst>
+        </p:spPr>
+      </p:pic>
+      <p:sp>
+        <p:nvSpPr>
+          <p:cNvPr id="4" name="TextBox 3">
+            <a:extLst>
+              <a:ext uri="{FF2B5EF4-FFF2-40B4-BE49-F238E27FC236}">
+                <a16:creationId xmlns:a16="http://schemas.microsoft.com/office/drawing/2014/main" id="{C173641A-00C5-D4D1-E366-0FE3C543840D}"/>
+              </a:ext>
+            </a:extLst>
+          </p:cNvPr>
+          <p:cNvSpPr txBox="1"/>
+          <p:nvPr/>
         </p:nvSpPr>
         <p:spPr>
           <a:xfrm>
-            <a:off x="5181600" y="304801"/>
-            <a:ext cx="6781800" cy="4648199"/>
+            <a:off x="609600" y="72479"/>
+            <a:ext cx="10972800" cy="769441"/>
           </a:xfrm>
+          <a:prstGeom prst="rect">
+            <a:avLst/>
+          </a:prstGeom>
+          <a:noFill/>
         </p:spPr>
         <p:txBody>
-          <a:bodyPr>
-            <a:normAutofit/>
+          <a:bodyPr wrap="square" rtlCol="0">
+            <a:spAutoFit/>
           </a:bodyPr>
           <a:lstStyle/>
           <a:p>
-            <a:r>
-              <a:rPr lang="en-US" dirty="0"/>
-              <a:t>2023 NBA Finals </a:t>
-            </a:r>
-            <a:br>
-              <a:rPr lang="en-US" dirty="0"/>
-            </a:br>
-            <a:br>
-              <a:rPr lang="en-US" dirty="0"/>
-            </a:br>
-            <a:r>
-              <a:rPr lang="en-US" dirty="0"/>
-              <a:t>	*MVP Predictor</a:t>
-            </a:r>
-            <a:br>
-              <a:rPr lang="en-US" dirty="0"/>
-            </a:br>
-            <a:br>
-              <a:rPr lang="en-US" dirty="0"/>
-            </a:br>
-            <a:r>
-              <a:rPr lang="en-US" dirty="0"/>
-              <a:t>	*Winning Team</a:t>
-            </a:r>
-            <a:br>
-              <a:rPr lang="en-US" dirty="0"/>
-            </a:br>
-            <a:endParaRPr lang="en-US" dirty="0"/>
+            <a:pPr algn="ctr"/>
+            <a:r>
+              <a:rPr lang="en-US" sz="4400" dirty="0"/>
+              <a:t>NBA MONEYBALL</a:t>
+            </a:r>
           </a:p>
         </p:txBody>
       </p:sp>
     </p:spTree>
     <p:extLst>
       <p:ext uri="{BB962C8B-B14F-4D97-AF65-F5344CB8AC3E}">
-        <p14:creationId xmlns:p14="http://schemas.microsoft.com/office/powerpoint/2010/main" val="576090978"/>
+        <p14:creationId xmlns:p14="http://schemas.microsoft.com/office/powerpoint/2010/main" val="259830435"/>
+      </p:ext>
+    </p:extLst>
+  </p:cSld>
+  <p:clrMapOvr>
+    <a:masterClrMapping/>
+  </p:clrMapOvr>
+  <mc:AlternateContent xmlns:mc="http://schemas.openxmlformats.org/markup-compatibility/2006" xmlns:p14="http://schemas.microsoft.com/office/powerpoint/2010/main">
+    <mc:Choice Requires="p14">
+      <p:transition spd="med" p14:dur="700">
+        <p:fade/>
+      </p:transition>
+    </mc:Choice>
+    <mc:Fallback xmlns="">
+      <p:transition spd="med">
+        <p:fade/>
+      </p:transition>
+    </mc:Fallback>
+  </mc:AlternateContent>
+</p:sld>
+</file>
+
+<file path=ppt/slides/slide10.xml><?xml version="1.0" encoding="utf-8"?>
+<p:sld xmlns:a="http://schemas.openxmlformats.org/drawingml/2006/main" xmlns:r="http://schemas.openxmlformats.org/officeDocument/2006/relationships" xmlns:p="http://schemas.openxmlformats.org/presentationml/2006/main">
+  <p:cSld>
+    <p:spTree>
+      <p:nvGrpSpPr>
+        <p:cNvPr id="1" name=""/>
+        <p:cNvGrpSpPr/>
+        <p:nvPr/>
+      </p:nvGrpSpPr>
+      <p:grpSpPr>
+        <a:xfrm>
+          <a:off x="0" y="0"/>
+          <a:ext cx="0" cy="0"/>
+          <a:chOff x="0" y="0"/>
+          <a:chExt cx="0" cy="0"/>
+        </a:xfrm>
+      </p:grpSpPr>
+    </p:spTree>
+    <p:extLst>
+      <p:ext uri="{BB962C8B-B14F-4D97-AF65-F5344CB8AC3E}">
+        <p14:creationId xmlns:p14="http://schemas.microsoft.com/office/powerpoint/2010/main" val="242861733"/>
       </p:ext>
     </p:extLst>
   </p:cSld>
@@ -3748,13 +3823,13 @@
             <a:spLocks noGrp="1"/>
           </p:cNvSpPr>
           <p:nvPr>
-            <p:ph type="title"/>
+            <p:ph type="ctrTitle"/>
           </p:nvPr>
         </p:nvSpPr>
         <p:spPr>
           <a:xfrm>
-            <a:off x="7467600" y="228600"/>
-            <a:ext cx="4724400" cy="4648200"/>
+            <a:off x="5181600" y="304801"/>
+            <a:ext cx="6781800" cy="4648199"/>
           </a:xfrm>
         </p:spPr>
         <p:txBody>
@@ -3764,70 +3839,28 @@
           <a:lstStyle/>
           <a:p>
             <a:r>
-              <a:rPr lang="en-US" sz="3200" dirty="0">
-                <a:solidFill>
-                  <a:schemeClr val="accent4">
-                    <a:lumMod val="50000"/>
-                    <a:lumOff val="50000"/>
-                  </a:schemeClr>
-                </a:solidFill>
-              </a:rPr>
-              <a:t>Machine Learning Models: </a:t>
+              <a:rPr lang="en-US" dirty="0"/>
+              <a:t>2023 NBA Finals </a:t>
             </a:r>
             <a:br>
-              <a:rPr lang="en-US" dirty="0">
-                <a:solidFill>
-                  <a:schemeClr val="accent4">
-                    <a:lumMod val="25000"/>
-                    <a:lumOff val="75000"/>
-                  </a:schemeClr>
-                </a:solidFill>
-              </a:rPr>
+              <a:rPr lang="en-US" dirty="0"/>
             </a:br>
             <a:br>
               <a:rPr lang="en-US" dirty="0"/>
             </a:br>
             <a:r>
-              <a:rPr lang="en-US" sz="2800" dirty="0">
-                <a:solidFill>
-                  <a:schemeClr val="accent1">
-                    <a:lumMod val="40000"/>
-                    <a:lumOff val="60000"/>
-                  </a:schemeClr>
-                </a:solidFill>
-              </a:rPr>
-              <a:t>* Linear Regression (MVP prediction)</a:t>
+              <a:rPr lang="en-US" dirty="0"/>
+              <a:t>	*MVP Predictor</a:t>
             </a:r>
             <a:br>
-              <a:rPr lang="en-US" sz="2800" dirty="0">
-                <a:solidFill>
-                  <a:schemeClr val="accent1">
-                    <a:lumMod val="40000"/>
-                    <a:lumOff val="60000"/>
-                  </a:schemeClr>
-                </a:solidFill>
-              </a:rPr>
+              <a:rPr lang="en-US" dirty="0"/>
             </a:br>
             <a:br>
-              <a:rPr lang="en-US" sz="2800" dirty="0">
-                <a:solidFill>
-                  <a:schemeClr val="accent1">
-                    <a:lumMod val="40000"/>
-                    <a:lumOff val="60000"/>
-                  </a:schemeClr>
-                </a:solidFill>
-              </a:rPr>
+              <a:rPr lang="en-US" dirty="0"/>
             </a:br>
             <a:r>
-              <a:rPr lang="en-US" sz="2800" dirty="0">
-                <a:solidFill>
-                  <a:schemeClr val="accent1">
-                    <a:lumMod val="40000"/>
-                    <a:lumOff val="60000"/>
-                  </a:schemeClr>
-                </a:solidFill>
-              </a:rPr>
-              <a:t>* Random Forest Regressor (Team Game predictions)</a:t>
+              <a:rPr lang="en-US" dirty="0"/>
+              <a:t>	*Winning Team</a:t>
             </a:r>
             <a:br>
               <a:rPr lang="en-US" dirty="0"/>
@@ -3838,15 +3871,19 @@
       </p:sp>
       <p:pic>
         <p:nvPicPr>
-          <p:cNvPr id="5" name="Picture Placeholder 4" descr="Basketball players raising hands together"/>
+          <p:cNvPr id="1028" name="Picture 4" descr="NBA Season Recaps: A look back at every season since 1946 | NBA.com">
+            <a:extLst>
+              <a:ext uri="{FF2B5EF4-FFF2-40B4-BE49-F238E27FC236}">
+                <a16:creationId xmlns:a16="http://schemas.microsoft.com/office/drawing/2014/main" id="{F4292BE0-71CD-6B6A-71FE-5923CE05E49B}"/>
+              </a:ext>
+            </a:extLst>
+          </p:cNvPr>
           <p:cNvPicPr>
-            <a:picLocks noGrp="1" noChangeAspect="1"/>
+            <a:picLocks noChangeAspect="1" noChangeArrowheads="1"/>
           </p:cNvPicPr>
-          <p:nvPr>
-            <p:ph type="pic" idx="1"/>
-          </p:nvPr>
+          <p:nvPr/>
         </p:nvPicPr>
-        <p:blipFill rotWithShape="1">
+        <p:blipFill>
           <a:blip r:embed="rId2" cstate="print">
             <a:extLst>
               <a:ext uri="{28A0092B-C50C-407E-A947-70E740481C1C}">
@@ -3855,90 +3892,34 @@
             </a:extLst>
           </a:blip>
           <a:srcRect/>
-          <a:stretch/>
+          <a:stretch>
+            <a:fillRect/>
+          </a:stretch>
         </p:blipFill>
-        <p:spPr/>
+        <p:spPr bwMode="auto">
+          <a:xfrm>
+            <a:off x="228600" y="228600"/>
+            <a:ext cx="4038600" cy="1600200"/>
+          </a:xfrm>
+          <a:prstGeom prst="rect">
+            <a:avLst/>
+          </a:prstGeom>
+          <a:noFill/>
+          <a:extLst>
+            <a:ext uri="{909E8E84-426E-40DD-AFC4-6F175D3DCCD1}">
+              <a14:hiddenFill xmlns:a14="http://schemas.microsoft.com/office/drawing/2010/main">
+                <a:solidFill>
+                  <a:srgbClr val="FFFFFF"/>
+                </a:solidFill>
+              </a14:hiddenFill>
+            </a:ext>
+          </a:extLst>
+        </p:spPr>
       </p:pic>
-      <p:sp>
-        <p:nvSpPr>
-          <p:cNvPr id="6" name="Rounded Rectangle 5" hidden="1"/>
-          <p:cNvSpPr/>
-          <p:nvPr/>
-        </p:nvSpPr>
-        <p:spPr>
-          <a:xfrm>
-            <a:off x="12344400" y="152400"/>
-            <a:ext cx="1295400" cy="6553200"/>
-          </a:xfrm>
-          <a:prstGeom prst="roundRect">
-            <a:avLst>
-              <a:gd name="adj" fmla="val 9717"/>
-            </a:avLst>
-          </a:prstGeom>
-          <a:solidFill>
-            <a:srgbClr val="A6A6A6"/>
-          </a:solidFill>
-          <a:ln>
-            <a:noFill/>
-          </a:ln>
-        </p:spPr>
-        <p:style>
-          <a:lnRef idx="2">
-            <a:schemeClr val="accent1">
-              <a:shade val="50000"/>
-            </a:schemeClr>
-          </a:lnRef>
-          <a:fillRef idx="1">
-            <a:schemeClr val="accent1"/>
-          </a:fillRef>
-          <a:effectRef idx="0">
-            <a:schemeClr val="accent1"/>
-          </a:effectRef>
-          <a:fontRef idx="minor">
-            <a:schemeClr val="lt1"/>
-          </a:fontRef>
-        </p:style>
-        <p:txBody>
-          <a:bodyPr rot="0" spcFirstLastPara="0" vertOverflow="overflow" horzOverflow="overflow" vert="horz" wrap="square" lIns="91440" tIns="45720" rIns="91440" bIns="45720" numCol="1" spcCol="0" rtlCol="0" fromWordArt="0" anchor="t" anchorCtr="0" forceAA="0" compatLnSpc="1">
-            <a:prstTxWarp prst="textNoShape">
-              <a:avLst/>
-            </a:prstTxWarp>
-            <a:noAutofit/>
-          </a:bodyPr>
-          <a:lstStyle/>
-          <a:p>
-            <a:r>
-              <a:rPr lang="en-US" sz="1200" b="1" i="1" dirty="0">
-                <a:latin typeface="Arial" pitchFamily="34" charset="0"/>
-                <a:cs typeface="Arial" pitchFamily="34" charset="0"/>
-              </a:rPr>
-              <a:t>NOTE:</a:t>
-            </a:r>
-          </a:p>
-          <a:p>
-            <a:r>
-              <a:rPr lang="en-US" sz="1200" i="1" dirty="0">
-                <a:latin typeface="Arial" pitchFamily="34" charset="0"/>
-                <a:cs typeface="Arial" pitchFamily="34" charset="0"/>
-              </a:rPr>
-              <a:t>To change images on this slide, select a picture and delete it. Then click the Insert Picture icon</a:t>
-            </a:r>
-          </a:p>
-          <a:p>
-            <a:r>
-              <a:rPr lang="en-US" sz="1200" i="1" dirty="0">
-                <a:latin typeface="Arial" pitchFamily="34" charset="0"/>
-                <a:cs typeface="Arial" pitchFamily="34" charset="0"/>
-              </a:rPr>
-              <a:t>in the placeholder to insert your own image.</a:t>
-            </a:r>
-          </a:p>
-        </p:txBody>
-      </p:sp>
     </p:spTree>
     <p:extLst>
       <p:ext uri="{BB962C8B-B14F-4D97-AF65-F5344CB8AC3E}">
-        <p14:creationId xmlns:p14="http://schemas.microsoft.com/office/powerpoint/2010/main" val="3053388791"/>
+        <p14:creationId xmlns:p14="http://schemas.microsoft.com/office/powerpoint/2010/main" val="576090978"/>
       </p:ext>
     </p:extLst>
   </p:cSld>
@@ -3989,6 +3970,242 @@
         </p:nvSpPr>
         <p:spPr>
           <a:xfrm>
+            <a:off x="7467600" y="228600"/>
+            <a:ext cx="4724400" cy="4648200"/>
+          </a:xfrm>
+        </p:spPr>
+        <p:txBody>
+          <a:bodyPr>
+            <a:normAutofit/>
+          </a:bodyPr>
+          <a:lstStyle/>
+          <a:p>
+            <a:r>
+              <a:rPr lang="en-US" sz="3200" dirty="0">
+                <a:solidFill>
+                  <a:schemeClr val="accent4">
+                    <a:lumMod val="50000"/>
+                    <a:lumOff val="50000"/>
+                  </a:schemeClr>
+                </a:solidFill>
+              </a:rPr>
+              <a:t>Machine Learning Models: </a:t>
+            </a:r>
+            <a:br>
+              <a:rPr lang="en-US" dirty="0">
+                <a:solidFill>
+                  <a:schemeClr val="accent4">
+                    <a:lumMod val="25000"/>
+                    <a:lumOff val="75000"/>
+                  </a:schemeClr>
+                </a:solidFill>
+              </a:rPr>
+            </a:br>
+            <a:br>
+              <a:rPr lang="en-US" dirty="0"/>
+            </a:br>
+            <a:r>
+              <a:rPr lang="en-US" sz="2800" dirty="0">
+                <a:solidFill>
+                  <a:schemeClr val="accent1">
+                    <a:lumMod val="40000"/>
+                    <a:lumOff val="60000"/>
+                  </a:schemeClr>
+                </a:solidFill>
+              </a:rPr>
+              <a:t>* Linear Regression (MVP prediction)</a:t>
+            </a:r>
+            <a:br>
+              <a:rPr lang="en-US" sz="2800" dirty="0">
+                <a:solidFill>
+                  <a:schemeClr val="accent1">
+                    <a:lumMod val="40000"/>
+                    <a:lumOff val="60000"/>
+                  </a:schemeClr>
+                </a:solidFill>
+              </a:rPr>
+            </a:br>
+            <a:br>
+              <a:rPr lang="en-US" sz="2800" dirty="0">
+                <a:solidFill>
+                  <a:schemeClr val="accent1">
+                    <a:lumMod val="40000"/>
+                    <a:lumOff val="60000"/>
+                  </a:schemeClr>
+                </a:solidFill>
+              </a:rPr>
+            </a:br>
+            <a:r>
+              <a:rPr lang="en-US" sz="2800" dirty="0">
+                <a:solidFill>
+                  <a:schemeClr val="accent1">
+                    <a:lumMod val="40000"/>
+                    <a:lumOff val="60000"/>
+                  </a:schemeClr>
+                </a:solidFill>
+              </a:rPr>
+              <a:t>* Random Forest Regressor (Team Game predictions)</a:t>
+            </a:r>
+            <a:br>
+              <a:rPr lang="en-US" dirty="0"/>
+            </a:br>
+            <a:endParaRPr lang="en-US" dirty="0"/>
+          </a:p>
+        </p:txBody>
+      </p:sp>
+      <p:pic>
+        <p:nvPicPr>
+          <p:cNvPr id="5" name="Picture Placeholder 4" descr="Basketball players raising hands together"/>
+          <p:cNvPicPr>
+            <a:picLocks noGrp="1" noChangeAspect="1"/>
+          </p:cNvPicPr>
+          <p:nvPr>
+            <p:ph type="pic" idx="1"/>
+          </p:nvPr>
+        </p:nvPicPr>
+        <p:blipFill rotWithShape="1">
+          <a:blip r:embed="rId2" cstate="print">
+            <a:extLst>
+              <a:ext uri="{28A0092B-C50C-407E-A947-70E740481C1C}">
+                <a14:useLocalDpi xmlns:a14="http://schemas.microsoft.com/office/drawing/2010/main" val="0"/>
+              </a:ext>
+            </a:extLst>
+          </a:blip>
+          <a:srcRect/>
+          <a:stretch/>
+        </p:blipFill>
+        <p:spPr/>
+      </p:pic>
+      <p:sp>
+        <p:nvSpPr>
+          <p:cNvPr id="6" name="Rounded Rectangle 5" hidden="1"/>
+          <p:cNvSpPr/>
+          <p:nvPr/>
+        </p:nvSpPr>
+        <p:spPr>
+          <a:xfrm>
+            <a:off x="12344400" y="152400"/>
+            <a:ext cx="1295400" cy="6553200"/>
+          </a:xfrm>
+          <a:prstGeom prst="roundRect">
+            <a:avLst>
+              <a:gd name="adj" fmla="val 9717"/>
+            </a:avLst>
+          </a:prstGeom>
+          <a:solidFill>
+            <a:srgbClr val="A6A6A6"/>
+          </a:solidFill>
+          <a:ln>
+            <a:noFill/>
+          </a:ln>
+        </p:spPr>
+        <p:style>
+          <a:lnRef idx="2">
+            <a:schemeClr val="accent1">
+              <a:shade val="50000"/>
+            </a:schemeClr>
+          </a:lnRef>
+          <a:fillRef idx="1">
+            <a:schemeClr val="accent1"/>
+          </a:fillRef>
+          <a:effectRef idx="0">
+            <a:schemeClr val="accent1"/>
+          </a:effectRef>
+          <a:fontRef idx="minor">
+            <a:schemeClr val="lt1"/>
+          </a:fontRef>
+        </p:style>
+        <p:txBody>
+          <a:bodyPr rot="0" spcFirstLastPara="0" vertOverflow="overflow" horzOverflow="overflow" vert="horz" wrap="square" lIns="91440" tIns="45720" rIns="91440" bIns="45720" numCol="1" spcCol="0" rtlCol="0" fromWordArt="0" anchor="t" anchorCtr="0" forceAA="0" compatLnSpc="1">
+            <a:prstTxWarp prst="textNoShape">
+              <a:avLst/>
+            </a:prstTxWarp>
+            <a:noAutofit/>
+          </a:bodyPr>
+          <a:lstStyle/>
+          <a:p>
+            <a:r>
+              <a:rPr lang="en-US" sz="1200" b="1" i="1" dirty="0">
+                <a:latin typeface="Arial" pitchFamily="34" charset="0"/>
+                <a:cs typeface="Arial" pitchFamily="34" charset="0"/>
+              </a:rPr>
+              <a:t>NOTE:</a:t>
+            </a:r>
+          </a:p>
+          <a:p>
+            <a:r>
+              <a:rPr lang="en-US" sz="1200" i="1" dirty="0">
+                <a:latin typeface="Arial" pitchFamily="34" charset="0"/>
+                <a:cs typeface="Arial" pitchFamily="34" charset="0"/>
+              </a:rPr>
+              <a:t>To change images on this slide, select a picture and delete it. Then click the Insert Picture icon</a:t>
+            </a:r>
+          </a:p>
+          <a:p>
+            <a:r>
+              <a:rPr lang="en-US" sz="1200" i="1" dirty="0">
+                <a:latin typeface="Arial" pitchFamily="34" charset="0"/>
+                <a:cs typeface="Arial" pitchFamily="34" charset="0"/>
+              </a:rPr>
+              <a:t>in the placeholder to insert your own image.</a:t>
+            </a:r>
+          </a:p>
+        </p:txBody>
+      </p:sp>
+    </p:spTree>
+    <p:extLst>
+      <p:ext uri="{BB962C8B-B14F-4D97-AF65-F5344CB8AC3E}">
+        <p14:creationId xmlns:p14="http://schemas.microsoft.com/office/powerpoint/2010/main" val="3053388791"/>
+      </p:ext>
+    </p:extLst>
+  </p:cSld>
+  <p:clrMapOvr>
+    <a:masterClrMapping/>
+  </p:clrMapOvr>
+  <mc:AlternateContent xmlns:mc="http://schemas.openxmlformats.org/markup-compatibility/2006" xmlns:p14="http://schemas.microsoft.com/office/powerpoint/2010/main">
+    <mc:Choice Requires="p14">
+      <p:transition spd="med" p14:dur="700">
+        <p:fade/>
+      </p:transition>
+    </mc:Choice>
+    <mc:Fallback xmlns="">
+      <p:transition spd="med">
+        <p:fade/>
+      </p:transition>
+    </mc:Fallback>
+  </mc:AlternateContent>
+</p:sld>
+</file>
+
+<file path=ppt/slides/slide4.xml><?xml version="1.0" encoding="utf-8"?>
+<p:sld xmlns:a="http://schemas.openxmlformats.org/drawingml/2006/main" xmlns:r="http://schemas.openxmlformats.org/officeDocument/2006/relationships" xmlns:p="http://schemas.openxmlformats.org/presentationml/2006/main">
+  <p:cSld>
+    <p:spTree>
+      <p:nvGrpSpPr>
+        <p:cNvPr id="1" name=""/>
+        <p:cNvGrpSpPr/>
+        <p:nvPr/>
+      </p:nvGrpSpPr>
+      <p:grpSpPr>
+        <a:xfrm>
+          <a:off x="0" y="0"/>
+          <a:ext cx="0" cy="0"/>
+          <a:chOff x="0" y="0"/>
+          <a:chExt cx="0" cy="0"/>
+        </a:xfrm>
+      </p:grpSpPr>
+      <p:sp>
+        <p:nvSpPr>
+          <p:cNvPr id="2" name="Title 1"/>
+          <p:cNvSpPr>
+            <a:spLocks noGrp="1"/>
+          </p:cNvSpPr>
+          <p:nvPr>
+            <p:ph type="title"/>
+          </p:nvPr>
+        </p:nvSpPr>
+        <p:spPr>
+          <a:xfrm>
             <a:off x="1066800" y="228600"/>
             <a:ext cx="10058400" cy="914400"/>
           </a:xfrm>
@@ -4109,7 +4326,7 @@
 </p:sld>
 </file>
 
-<file path=ppt/slides/slide4.xml><?xml version="1.0" encoding="utf-8"?>
+<file path=ppt/slides/slide5.xml><?xml version="1.0" encoding="utf-8"?>
 <p:sld xmlns:a="http://schemas.openxmlformats.org/drawingml/2006/main" xmlns:r="http://schemas.openxmlformats.org/officeDocument/2006/relationships" xmlns:p="http://schemas.openxmlformats.org/presentationml/2006/main">
   <p:cSld>
     <p:spTree>
@@ -4225,7 +4442,7 @@
 </p:sld>
 </file>
 
-<file path=ppt/slides/slide5.xml><?xml version="1.0" encoding="utf-8"?>
+<file path=ppt/slides/slide6.xml><?xml version="1.0" encoding="utf-8"?>
 <p:sld xmlns:a="http://schemas.openxmlformats.org/drawingml/2006/main" xmlns:r="http://schemas.openxmlformats.org/officeDocument/2006/relationships" xmlns:p="http://schemas.openxmlformats.org/presentationml/2006/main">
   <p:cSld>
     <p:spTree>
@@ -4576,89 +4793,6 @@
 </p:sld>
 </file>
 
-<file path=ppt/slides/slide6.xml><?xml version="1.0" encoding="utf-8"?>
-<p:sld xmlns:a="http://schemas.openxmlformats.org/drawingml/2006/main" xmlns:r="http://schemas.openxmlformats.org/officeDocument/2006/relationships" xmlns:p="http://schemas.openxmlformats.org/presentationml/2006/main">
-  <p:cSld>
-    <p:spTree>
-      <p:nvGrpSpPr>
-        <p:cNvPr id="1" name=""/>
-        <p:cNvGrpSpPr/>
-        <p:nvPr/>
-      </p:nvGrpSpPr>
-      <p:grpSpPr>
-        <a:xfrm>
-          <a:off x="0" y="0"/>
-          <a:ext cx="0" cy="0"/>
-          <a:chOff x="0" y="0"/>
-          <a:chExt cx="0" cy="0"/>
-        </a:xfrm>
-      </p:grpSpPr>
-      <p:sp>
-        <p:nvSpPr>
-          <p:cNvPr id="2" name="Title 1"/>
-          <p:cNvSpPr>
-            <a:spLocks noGrp="1"/>
-          </p:cNvSpPr>
-          <p:nvPr>
-            <p:ph type="title"/>
-          </p:nvPr>
-        </p:nvSpPr>
-        <p:spPr/>
-        <p:txBody>
-          <a:bodyPr/>
-          <a:lstStyle/>
-          <a:p>
-            <a:r>
-              <a:rPr lang="en-US" dirty="0"/>
-              <a:t>Add a Slide Title - 1</a:t>
-            </a:r>
-          </a:p>
-        </p:txBody>
-      </p:sp>
-      <p:sp>
-        <p:nvSpPr>
-          <p:cNvPr id="3" name="Text Placeholder 2"/>
-          <p:cNvSpPr>
-            <a:spLocks noGrp="1"/>
-          </p:cNvSpPr>
-          <p:nvPr>
-            <p:ph type="body" idx="1"/>
-          </p:nvPr>
-        </p:nvSpPr>
-        <p:spPr/>
-        <p:txBody>
-          <a:bodyPr/>
-          <a:lstStyle/>
-          <a:p>
-            <a:endParaRPr lang="en-US"/>
-          </a:p>
-        </p:txBody>
-      </p:sp>
-    </p:spTree>
-    <p:extLst>
-      <p:ext uri="{BB962C8B-B14F-4D97-AF65-F5344CB8AC3E}">
-        <p14:creationId xmlns:p14="http://schemas.microsoft.com/office/powerpoint/2010/main" val="2993111047"/>
-      </p:ext>
-    </p:extLst>
-  </p:cSld>
-  <p:clrMapOvr>
-    <a:masterClrMapping/>
-  </p:clrMapOvr>
-  <mc:AlternateContent xmlns:mc="http://schemas.openxmlformats.org/markup-compatibility/2006" xmlns:p14="http://schemas.microsoft.com/office/powerpoint/2010/main">
-    <mc:Choice Requires="p14">
-      <p:transition spd="med" p14:dur="700">
-        <p:fade/>
-      </p:transition>
-    </mc:Choice>
-    <mc:Fallback xmlns="">
-      <p:transition spd="med">
-        <p:fade/>
-      </p:transition>
-    </mc:Fallback>
-  </mc:AlternateContent>
-</p:sld>
-</file>
-
 <file path=ppt/slides/slide7.xml><?xml version="1.0" encoding="utf-8"?>
 <p:sld xmlns:a="http://schemas.openxmlformats.org/drawingml/2006/main" xmlns:r="http://schemas.openxmlformats.org/officeDocument/2006/relationships" xmlns:p="http://schemas.openxmlformats.org/presentationml/2006/main">
   <p:cSld>
@@ -4693,7 +4827,7 @@
           <a:p>
             <a:r>
               <a:rPr lang="en-US" dirty="0"/>
-              <a:t>Add a Slide Title - 2</a:t>
+              <a:t>Add a Slide Title - 1</a:t>
             </a:r>
           </a:p>
         </p:txBody>
@@ -4706,63 +4840,6 @@
           </p:cNvSpPr>
           <p:nvPr>
             <p:ph type="body" idx="1"/>
-          </p:nvPr>
-        </p:nvSpPr>
-        <p:spPr/>
-        <p:txBody>
-          <a:bodyPr/>
-          <a:lstStyle/>
-          <a:p>
-            <a:endParaRPr lang="en-US"/>
-          </a:p>
-        </p:txBody>
-      </p:sp>
-      <p:sp>
-        <p:nvSpPr>
-          <p:cNvPr id="4" name="Content Placeholder 3"/>
-          <p:cNvSpPr>
-            <a:spLocks noGrp="1"/>
-          </p:cNvSpPr>
-          <p:nvPr>
-            <p:ph sz="half" idx="2"/>
-          </p:nvPr>
-        </p:nvSpPr>
-        <p:spPr/>
-        <p:txBody>
-          <a:bodyPr/>
-          <a:lstStyle/>
-          <a:p>
-            <a:endParaRPr lang="en-US"/>
-          </a:p>
-        </p:txBody>
-      </p:sp>
-      <p:sp>
-        <p:nvSpPr>
-          <p:cNvPr id="5" name="Text Placeholder 4"/>
-          <p:cNvSpPr>
-            <a:spLocks noGrp="1"/>
-          </p:cNvSpPr>
-          <p:nvPr>
-            <p:ph type="body" sz="quarter" idx="3"/>
-          </p:nvPr>
-        </p:nvSpPr>
-        <p:spPr/>
-        <p:txBody>
-          <a:bodyPr/>
-          <a:lstStyle/>
-          <a:p>
-            <a:endParaRPr lang="en-US"/>
-          </a:p>
-        </p:txBody>
-      </p:sp>
-      <p:sp>
-        <p:nvSpPr>
-          <p:cNvPr id="6" name="Content Placeholder 5"/>
-          <p:cNvSpPr>
-            <a:spLocks noGrp="1"/>
-          </p:cNvSpPr>
-          <p:nvPr>
-            <p:ph sz="quarter" idx="4"/>
           </p:nvPr>
         </p:nvSpPr>
         <p:spPr/>
@@ -4777,7 +4854,7 @@
     </p:spTree>
     <p:extLst>
       <p:ext uri="{BB962C8B-B14F-4D97-AF65-F5344CB8AC3E}">
-        <p14:creationId xmlns:p14="http://schemas.microsoft.com/office/powerpoint/2010/main" val="4078798235"/>
+        <p14:creationId xmlns:p14="http://schemas.microsoft.com/office/powerpoint/2010/main" val="2993111047"/>
       </p:ext>
     </p:extLst>
   </p:cSld>
@@ -4833,15 +4910,91 @@
           <a:p>
             <a:r>
               <a:rPr lang="en-US" dirty="0"/>
-              <a:t>Add a Slide Title - 3</a:t>
-            </a:r>
+              <a:t>Add a Slide Title - 2</a:t>
+            </a:r>
+          </a:p>
+        </p:txBody>
+      </p:sp>
+      <p:sp>
+        <p:nvSpPr>
+          <p:cNvPr id="3" name="Text Placeholder 2"/>
+          <p:cNvSpPr>
+            <a:spLocks noGrp="1"/>
+          </p:cNvSpPr>
+          <p:nvPr>
+            <p:ph type="body" idx="1"/>
+          </p:nvPr>
+        </p:nvSpPr>
+        <p:spPr/>
+        <p:txBody>
+          <a:bodyPr/>
+          <a:lstStyle/>
+          <a:p>
+            <a:endParaRPr lang="en-US"/>
+          </a:p>
+        </p:txBody>
+      </p:sp>
+      <p:sp>
+        <p:nvSpPr>
+          <p:cNvPr id="4" name="Content Placeholder 3"/>
+          <p:cNvSpPr>
+            <a:spLocks noGrp="1"/>
+          </p:cNvSpPr>
+          <p:nvPr>
+            <p:ph sz="half" idx="2"/>
+          </p:nvPr>
+        </p:nvSpPr>
+        <p:spPr/>
+        <p:txBody>
+          <a:bodyPr/>
+          <a:lstStyle/>
+          <a:p>
+            <a:endParaRPr lang="en-US"/>
+          </a:p>
+        </p:txBody>
+      </p:sp>
+      <p:sp>
+        <p:nvSpPr>
+          <p:cNvPr id="5" name="Text Placeholder 4"/>
+          <p:cNvSpPr>
+            <a:spLocks noGrp="1"/>
+          </p:cNvSpPr>
+          <p:nvPr>
+            <p:ph type="body" sz="quarter" idx="3"/>
+          </p:nvPr>
+        </p:nvSpPr>
+        <p:spPr/>
+        <p:txBody>
+          <a:bodyPr/>
+          <a:lstStyle/>
+          <a:p>
+            <a:endParaRPr lang="en-US"/>
+          </a:p>
+        </p:txBody>
+      </p:sp>
+      <p:sp>
+        <p:nvSpPr>
+          <p:cNvPr id="6" name="Content Placeholder 5"/>
+          <p:cNvSpPr>
+            <a:spLocks noGrp="1"/>
+          </p:cNvSpPr>
+          <p:nvPr>
+            <p:ph sz="quarter" idx="4"/>
+          </p:nvPr>
+        </p:nvSpPr>
+        <p:spPr/>
+        <p:txBody>
+          <a:bodyPr/>
+          <a:lstStyle/>
+          <a:p>
+            <a:endParaRPr lang="en-US"/>
           </a:p>
         </p:txBody>
       </p:sp>
     </p:spTree>
     <p:extLst>
       <p:ext uri="{BB962C8B-B14F-4D97-AF65-F5344CB8AC3E}">
-        <p14:creationId xmlns:p14="http://schemas.microsoft.com/office/powerpoint/2010/main" val="1864551520"/>
+        <p14:creationId xmlns:p14="http://schemas.microsoft.com/office/powerpoint/2010/main" val="4078798235"/>
       </p:ext>
     </p:extLst>
   </p:cSld>
@@ -4880,10 +5033,69 @@
           <a:chExt cx="0" cy="0"/>
         </a:xfrm>
       </p:grpSpPr>
+      <p:sp>
+        <p:nvSpPr>
+          <p:cNvPr id="2" name="Title 1"/>
+          <p:cNvSpPr>
+            <a:spLocks noGrp="1"/>
+          </p:cNvSpPr>
+          <p:nvPr>
+            <p:ph type="title"/>
+          </p:nvPr>
+        </p:nvSpPr>
+        <p:spPr>
+          <a:xfrm>
+            <a:off x="1066800" y="304800"/>
+            <a:ext cx="10058400" cy="533400"/>
+          </a:xfrm>
+        </p:spPr>
+        <p:txBody>
+          <a:bodyPr>
+            <a:normAutofit fontScale="90000"/>
+          </a:bodyPr>
+          <a:lstStyle/>
+          <a:p>
+            <a:r>
+              <a:rPr lang="en-US" dirty="0"/>
+              <a:t>Game 4 predictions: results, comparison &amp; potential payout</a:t>
+            </a:r>
+          </a:p>
+        </p:txBody>
+      </p:sp>
+      <p:pic>
+        <p:nvPicPr>
+          <p:cNvPr id="4" name="Picture 3">
+            <a:extLst>
+              <a:ext uri="{FF2B5EF4-FFF2-40B4-BE49-F238E27FC236}">
+                <a16:creationId xmlns:a16="http://schemas.microsoft.com/office/drawing/2014/main" id="{4A40664E-FA96-6913-6E75-7EDB5884DF5E}"/>
+              </a:ext>
+            </a:extLst>
+          </p:cNvPr>
+          <p:cNvPicPr>
+            <a:picLocks noChangeAspect="1"/>
+          </p:cNvPicPr>
+          <p:nvPr/>
+        </p:nvPicPr>
+        <p:blipFill>
+          <a:blip r:embed="rId2"/>
+          <a:stretch>
+            <a:fillRect/>
+          </a:stretch>
+        </p:blipFill>
+        <p:spPr>
+          <a:xfrm>
+            <a:off x="381000" y="990600"/>
+            <a:ext cx="5257800" cy="3327722"/>
+          </a:xfrm>
+          <a:prstGeom prst="rect">
+            <a:avLst/>
+          </a:prstGeom>
+        </p:spPr>
+      </p:pic>
     </p:spTree>
     <p:extLst>
       <p:ext uri="{BB962C8B-B14F-4D97-AF65-F5344CB8AC3E}">
-        <p14:creationId xmlns:p14="http://schemas.microsoft.com/office/powerpoint/2010/main" val="242861733"/>
+        <p14:creationId xmlns:p14="http://schemas.microsoft.com/office/powerpoint/2010/main" val="1864551520"/>
       </p:ext>
     </p:extLst>
   </p:cSld>

</xml_diff>